<commit_message>
Removed animation from the last slide in PresentationTemplate.pptx Added Reliability.pptx
</commit_message>
<xml_diff>
--- a/PresentationTemplate.pptx
+++ b/PresentationTemplate.pptx
@@ -6228,88 +6228,9 @@
   <p:timing>
     <p:tnLst>
       <p:par>
-        <p:cTn id="1" dur="indefinite" restart="never" nodeType="tmRoot">
-          <p:childTnLst>
-            <p:seq concurrent="1" nextAc="seek">
-              <p:cTn id="2" dur="indefinite" nodeType="mainSeq">
-                <p:childTnLst>
-                  <p:par>
-                    <p:cTn id="3" fill="hold">
-                      <p:stCondLst>
-                        <p:cond delay="indefinite"/>
-                      </p:stCondLst>
-                      <p:childTnLst>
-                        <p:par>
-                          <p:cTn id="4" fill="hold">
-                            <p:stCondLst>
-                              <p:cond delay="0"/>
-                            </p:stCondLst>
-                            <p:childTnLst>
-                              <p:par>
-                                <p:cTn id="5" presetID="20" presetClass="entr" presetSubtype="0" fill="hold" grpId="0" nodeType="clickEffect">
-                                  <p:stCondLst>
-                                    <p:cond delay="0"/>
-                                  </p:stCondLst>
-                                  <p:childTnLst>
-                                    <p:set>
-                                      <p:cBhvr>
-                                        <p:cTn id="6" dur="1" fill="hold">
-                                          <p:stCondLst>
-                                            <p:cond delay="0"/>
-                                          </p:stCondLst>
-                                        </p:cTn>
-                                        <p:tgtEl>
-                                          <p:spTgt spid="7"/>
-                                        </p:tgtEl>
-                                        <p:attrNameLst>
-                                          <p:attrName>style.visibility</p:attrName>
-                                        </p:attrNameLst>
-                                      </p:cBhvr>
-                                      <p:to>
-                                        <p:strVal val="visible"/>
-                                      </p:to>
-                                    </p:set>
-                                    <p:animEffect transition="in" filter="wedge">
-                                      <p:cBhvr>
-                                        <p:cTn id="7" dur="5000"/>
-                                        <p:tgtEl>
-                                          <p:spTgt spid="7"/>
-                                        </p:tgtEl>
-                                      </p:cBhvr>
-                                    </p:animEffect>
-                                  </p:childTnLst>
-                                </p:cTn>
-                              </p:par>
-                            </p:childTnLst>
-                          </p:cTn>
-                        </p:par>
-                      </p:childTnLst>
-                    </p:cTn>
-                  </p:par>
-                </p:childTnLst>
-              </p:cTn>
-              <p:prevCondLst>
-                <p:cond evt="onPrev" delay="0">
-                  <p:tgtEl>
-                    <p:sldTgt/>
-                  </p:tgtEl>
-                </p:cond>
-              </p:prevCondLst>
-              <p:nextCondLst>
-                <p:cond evt="onNext" delay="0">
-                  <p:tgtEl>
-                    <p:sldTgt/>
-                  </p:tgtEl>
-                </p:cond>
-              </p:nextCondLst>
-            </p:seq>
-          </p:childTnLst>
-        </p:cTn>
+        <p:cTn id="1" dur="indefinite" restart="never" nodeType="tmRoot"/>
       </p:par>
     </p:tnLst>
-    <p:bldLst>
-      <p:bldP spid="7" grpId="0"/>
-    </p:bldLst>
   </p:timing>
 </p:sld>
 </file>

</xml_diff>

<commit_message>
Fixed arrows in the PresentationTemplate.pptx
</commit_message>
<xml_diff>
--- a/PresentationTemplate.pptx
+++ b/PresentationTemplate.pptx
@@ -7,8 +7,8 @@
   <p:sldIdLst>
     <p:sldId id="256" r:id="rId2"/>
     <p:sldId id="257" r:id="rId3"/>
-    <p:sldId id="264" r:id="rId4"/>
-    <p:sldId id="263" r:id="rId5"/>
+    <p:sldId id="263" r:id="rId4"/>
+    <p:sldId id="264" r:id="rId5"/>
     <p:sldId id="262" r:id="rId6"/>
   </p:sldIdLst>
   <p:sldSz cx="12192000" cy="6858000"/>
@@ -874,7 +874,7 @@
             <a:fld id="{B61BEF0D-F0BB-DE4B-95CE-6DB70DBA9567}" type="datetimeFigureOut">
               <a:rPr lang="en-US" dirty="0"/>
               <a:pPr/>
-              <a:t>11/14/2015</a:t>
+              <a:t>11/16/2015</a:t>
             </a:fld>
             <a:endParaRPr lang="en-US" dirty="0"/>
           </a:p>
@@ -1122,7 +1122,7 @@
             <a:fld id="{B61BEF0D-F0BB-DE4B-95CE-6DB70DBA9567}" type="datetimeFigureOut">
               <a:rPr lang="en-US" dirty="0"/>
               <a:pPr/>
-              <a:t>11/14/2015</a:t>
+              <a:t>11/16/2015</a:t>
             </a:fld>
             <a:endParaRPr lang="en-US" dirty="0"/>
           </a:p>
@@ -1433,7 +1433,7 @@
             <a:fld id="{B61BEF0D-F0BB-DE4B-95CE-6DB70DBA9567}" type="datetimeFigureOut">
               <a:rPr lang="en-US" dirty="0"/>
               <a:pPr/>
-              <a:t>11/14/2015</a:t>
+              <a:t>11/16/2015</a:t>
             </a:fld>
             <a:endParaRPr lang="en-US" dirty="0"/>
           </a:p>
@@ -1763,7 +1763,7 @@
             <a:fld id="{B61BEF0D-F0BB-DE4B-95CE-6DB70DBA9567}" type="datetimeFigureOut">
               <a:rPr lang="en-US" dirty="0"/>
               <a:pPr/>
-              <a:t>11/14/2015</a:t>
+              <a:t>11/16/2015</a:t>
             </a:fld>
             <a:endParaRPr lang="en-US" dirty="0"/>
           </a:p>
@@ -2074,7 +2074,7 @@
             <a:fld id="{B61BEF0D-F0BB-DE4B-95CE-6DB70DBA9567}" type="datetimeFigureOut">
               <a:rPr lang="en-US" dirty="0"/>
               <a:pPr/>
-              <a:t>11/14/2015</a:t>
+              <a:t>11/16/2015</a:t>
             </a:fld>
             <a:endParaRPr lang="en-US" dirty="0"/>
           </a:p>
@@ -2464,7 +2464,7 @@
             <a:fld id="{B61BEF0D-F0BB-DE4B-95CE-6DB70DBA9567}" type="datetimeFigureOut">
               <a:rPr lang="en-US" dirty="0"/>
               <a:pPr/>
-              <a:t>11/14/2015</a:t>
+              <a:t>11/16/2015</a:t>
             </a:fld>
             <a:endParaRPr lang="en-US" dirty="0"/>
           </a:p>
@@ -2630,7 +2630,7 @@
           <a:p>
             <a:fld id="{55C6B4A9-1611-4792-9094-5F34BCA07E0B}" type="datetimeFigureOut">
               <a:rPr lang="en-US" dirty="0"/>
-              <a:t>11/14/2015</a:t>
+              <a:t>11/16/2015</a:t>
             </a:fld>
             <a:endParaRPr lang="en-US" dirty="0"/>
           </a:p>
@@ -2806,7 +2806,7 @@
             <a:fld id="{B61BEF0D-F0BB-DE4B-95CE-6DB70DBA9567}" type="datetimeFigureOut">
               <a:rPr lang="en-US" dirty="0"/>
               <a:pPr/>
-              <a:t>11/14/2015</a:t>
+              <a:t>11/16/2015</a:t>
             </a:fld>
             <a:endParaRPr lang="en-US" dirty="0"/>
           </a:p>
@@ -2972,7 +2972,7 @@
           <a:p>
             <a:fld id="{42A54C80-263E-416B-A8E0-580EDEADCBDC}" type="datetimeFigureOut">
               <a:rPr lang="en-US" dirty="0"/>
-              <a:t>11/14/2015</a:t>
+              <a:t>11/16/2015</a:t>
             </a:fld>
             <a:endParaRPr lang="en-US" dirty="0"/>
           </a:p>
@@ -3215,7 +3215,7 @@
             <a:fld id="{B61BEF0D-F0BB-DE4B-95CE-6DB70DBA9567}" type="datetimeFigureOut">
               <a:rPr lang="en-US" dirty="0"/>
               <a:pPr/>
-              <a:t>11/14/2015</a:t>
+              <a:t>11/16/2015</a:t>
             </a:fld>
             <a:endParaRPr lang="en-US" dirty="0"/>
           </a:p>
@@ -3443,7 +3443,7 @@
           <a:p>
             <a:fld id="{42A54C80-263E-416B-A8E0-580EDEADCBDC}" type="datetimeFigureOut">
               <a:rPr lang="en-US" dirty="0"/>
-              <a:t>11/14/2015</a:t>
+              <a:t>11/16/2015</a:t>
             </a:fld>
             <a:endParaRPr lang="en-US" dirty="0"/>
           </a:p>
@@ -3813,7 +3813,7 @@
             <a:fld id="{B61BEF0D-F0BB-DE4B-95CE-6DB70DBA9567}" type="datetimeFigureOut">
               <a:rPr lang="en-US" dirty="0"/>
               <a:pPr/>
-              <a:t>11/14/2015</a:t>
+              <a:t>11/16/2015</a:t>
             </a:fld>
             <a:endParaRPr lang="en-US" dirty="0"/>
           </a:p>
@@ -3933,7 +3933,7 @@
             <a:fld id="{B61BEF0D-F0BB-DE4B-95CE-6DB70DBA9567}" type="datetimeFigureOut">
               <a:rPr lang="en-US" dirty="0"/>
               <a:pPr/>
-              <a:t>11/14/2015</a:t>
+              <a:t>11/16/2015</a:t>
             </a:fld>
             <a:endParaRPr lang="en-US" dirty="0"/>
           </a:p>
@@ -4025,7 +4025,7 @@
             <a:fld id="{B61BEF0D-F0BB-DE4B-95CE-6DB70DBA9567}" type="datetimeFigureOut">
               <a:rPr lang="en-US" dirty="0"/>
               <a:pPr/>
-              <a:t>11/14/2015</a:t>
+              <a:t>11/16/2015</a:t>
             </a:fld>
             <a:endParaRPr lang="en-US" dirty="0"/>
           </a:p>
@@ -4276,7 +4276,7 @@
           <a:p>
             <a:fld id="{42A54C80-263E-416B-A8E0-580EDEADCBDC}" type="datetimeFigureOut">
               <a:rPr lang="en-US" dirty="0"/>
-              <a:t>11/14/2015</a:t>
+              <a:t>11/16/2015</a:t>
             </a:fld>
             <a:endParaRPr lang="en-US" dirty="0"/>
           </a:p>
@@ -4578,7 +4578,7 @@
             <a:fld id="{B61BEF0D-F0BB-DE4B-95CE-6DB70DBA9567}" type="datetimeFigureOut">
               <a:rPr lang="en-US" dirty="0"/>
               <a:pPr/>
-              <a:t>11/14/2015</a:t>
+              <a:t>11/16/2015</a:t>
             </a:fld>
             <a:endParaRPr lang="en-US" dirty="0"/>
           </a:p>
@@ -5276,7 +5276,7 @@
             <a:fld id="{B61BEF0D-F0BB-DE4B-95CE-6DB70DBA9567}" type="datetimeFigureOut">
               <a:rPr lang="en-US" dirty="0"/>
               <a:pPr/>
-              <a:t>11/14/2015</a:t>
+              <a:t>11/16/2015</a:t>
             </a:fld>
             <a:endParaRPr lang="en-US" dirty="0"/>
           </a:p>
@@ -5986,6 +5986,10 @@
           </a:bodyPr>
           <a:lstStyle/>
           <a:p>
+            <a:pPr>
+              <a:buFont typeface="Wingdings" panose="05000000000000000000" pitchFamily="2" charset="2"/>
+              <a:buChar char="Ø"/>
+            </a:pPr>
             <a:r>
               <a:rPr lang="en-US" sz="2400" dirty="0" smtClean="0"/>
               <a:t>Slide Content</a:t>
@@ -6066,6 +6070,10 @@
           </a:bodyPr>
           <a:lstStyle/>
           <a:p>
+            <a:pPr>
+              <a:buFont typeface="Wingdings" panose="05000000000000000000" pitchFamily="2" charset="2"/>
+              <a:buChar char="Ø"/>
+            </a:pPr>
             <a:r>
               <a:rPr lang="en-US" sz="2400" dirty="0" smtClean="0"/>
               <a:t>Slide Content</a:t>
@@ -6077,7 +6085,7 @@
     </p:spTree>
     <p:extLst>
       <p:ext uri="{BB962C8B-B14F-4D97-AF65-F5344CB8AC3E}">
-        <p14:creationId xmlns:p14="http://schemas.microsoft.com/office/powerpoint/2010/main" val="2510236076"/>
+        <p14:creationId xmlns:p14="http://schemas.microsoft.com/office/powerpoint/2010/main" val="2347658486"/>
       </p:ext>
     </p:extLst>
   </p:cSld>
@@ -6146,6 +6154,10 @@
           </a:bodyPr>
           <a:lstStyle/>
           <a:p>
+            <a:pPr>
+              <a:buFont typeface="Wingdings" panose="05000000000000000000" pitchFamily="2" charset="2"/>
+              <a:buChar char="Ø"/>
+            </a:pPr>
             <a:r>
               <a:rPr lang="en-US" sz="2400" dirty="0" smtClean="0"/>
               <a:t>Slide Content</a:t>
@@ -6157,7 +6169,7 @@
     </p:spTree>
     <p:extLst>
       <p:ext uri="{BB962C8B-B14F-4D97-AF65-F5344CB8AC3E}">
-        <p14:creationId xmlns:p14="http://schemas.microsoft.com/office/powerpoint/2010/main" val="3419869146"/>
+        <p14:creationId xmlns:p14="http://schemas.microsoft.com/office/powerpoint/2010/main" val="2825630798"/>
       </p:ext>
     </p:extLst>
   </p:cSld>

</xml_diff>